<commit_message>
changed Set to LinkedHasgSet to retain order, improved searching methods, added radio buttons for order tiles, added order detail dialog
</commit_message>
<xml_diff>
--- a/docs/banner.pptx
+++ b/docs/banner.pptx
@@ -290,7 +290,7 @@
           <a:p>
             <a:fld id="{C0F63DD1-BCE7-4C77-B9DF-40A544824F47}" type="datetimeFigureOut">
               <a:rPr lang="en-PH" smtClean="0"/>
-              <a:t>03/06/2023</a:t>
+              <a:t>07/06/2023</a:t>
             </a:fld>
             <a:endParaRPr lang="en-PH"/>
           </a:p>
@@ -490,7 +490,7 @@
           <a:p>
             <a:fld id="{C0F63DD1-BCE7-4C77-B9DF-40A544824F47}" type="datetimeFigureOut">
               <a:rPr lang="en-PH" smtClean="0"/>
-              <a:t>03/06/2023</a:t>
+              <a:t>07/06/2023</a:t>
             </a:fld>
             <a:endParaRPr lang="en-PH"/>
           </a:p>
@@ -700,7 +700,7 @@
           <a:p>
             <a:fld id="{C0F63DD1-BCE7-4C77-B9DF-40A544824F47}" type="datetimeFigureOut">
               <a:rPr lang="en-PH" smtClean="0"/>
-              <a:t>03/06/2023</a:t>
+              <a:t>07/06/2023</a:t>
             </a:fld>
             <a:endParaRPr lang="en-PH"/>
           </a:p>
@@ -900,7 +900,7 @@
           <a:p>
             <a:fld id="{C0F63DD1-BCE7-4C77-B9DF-40A544824F47}" type="datetimeFigureOut">
               <a:rPr lang="en-PH" smtClean="0"/>
-              <a:t>03/06/2023</a:t>
+              <a:t>07/06/2023</a:t>
             </a:fld>
             <a:endParaRPr lang="en-PH"/>
           </a:p>
@@ -1176,7 +1176,7 @@
           <a:p>
             <a:fld id="{C0F63DD1-BCE7-4C77-B9DF-40A544824F47}" type="datetimeFigureOut">
               <a:rPr lang="en-PH" smtClean="0"/>
-              <a:t>03/06/2023</a:t>
+              <a:t>07/06/2023</a:t>
             </a:fld>
             <a:endParaRPr lang="en-PH"/>
           </a:p>
@@ -1444,7 +1444,7 @@
           <a:p>
             <a:fld id="{C0F63DD1-BCE7-4C77-B9DF-40A544824F47}" type="datetimeFigureOut">
               <a:rPr lang="en-PH" smtClean="0"/>
-              <a:t>03/06/2023</a:t>
+              <a:t>07/06/2023</a:t>
             </a:fld>
             <a:endParaRPr lang="en-PH"/>
           </a:p>
@@ -1859,7 +1859,7 @@
           <a:p>
             <a:fld id="{C0F63DD1-BCE7-4C77-B9DF-40A544824F47}" type="datetimeFigureOut">
               <a:rPr lang="en-PH" smtClean="0"/>
-              <a:t>03/06/2023</a:t>
+              <a:t>07/06/2023</a:t>
             </a:fld>
             <a:endParaRPr lang="en-PH"/>
           </a:p>
@@ -2001,7 +2001,7 @@
           <a:p>
             <a:fld id="{C0F63DD1-BCE7-4C77-B9DF-40A544824F47}" type="datetimeFigureOut">
               <a:rPr lang="en-PH" smtClean="0"/>
-              <a:t>03/06/2023</a:t>
+              <a:t>07/06/2023</a:t>
             </a:fld>
             <a:endParaRPr lang="en-PH"/>
           </a:p>
@@ -2114,7 +2114,7 @@
           <a:p>
             <a:fld id="{C0F63DD1-BCE7-4C77-B9DF-40A544824F47}" type="datetimeFigureOut">
               <a:rPr lang="en-PH" smtClean="0"/>
-              <a:t>03/06/2023</a:t>
+              <a:t>07/06/2023</a:t>
             </a:fld>
             <a:endParaRPr lang="en-PH"/>
           </a:p>
@@ -2427,7 +2427,7 @@
           <a:p>
             <a:fld id="{C0F63DD1-BCE7-4C77-B9DF-40A544824F47}" type="datetimeFigureOut">
               <a:rPr lang="en-PH" smtClean="0"/>
-              <a:t>03/06/2023</a:t>
+              <a:t>07/06/2023</a:t>
             </a:fld>
             <a:endParaRPr lang="en-PH"/>
           </a:p>
@@ -2716,7 +2716,7 @@
           <a:p>
             <a:fld id="{C0F63DD1-BCE7-4C77-B9DF-40A544824F47}" type="datetimeFigureOut">
               <a:rPr lang="en-PH" smtClean="0"/>
-              <a:t>03/06/2023</a:t>
+              <a:t>07/06/2023</a:t>
             </a:fld>
             <a:endParaRPr lang="en-PH"/>
           </a:p>
@@ -2959,7 +2959,7 @@
           <a:p>
             <a:fld id="{C0F63DD1-BCE7-4C77-B9DF-40A544824F47}" type="datetimeFigureOut">
               <a:rPr lang="en-PH" smtClean="0"/>
-              <a:t>03/06/2023</a:t>
+              <a:t>07/06/2023</a:t>
             </a:fld>
             <a:endParaRPr lang="en-PH"/>
           </a:p>
@@ -3578,64 +3578,12 @@
           <a:chExt cx="0" cy="0"/>
         </a:xfrm>
       </p:grpSpPr>
-      <p:sp>
-        <p:nvSpPr>
-          <p:cNvPr id="17" name="Rectangle 16">
-            <a:extLst>
-              <a:ext uri="{FF2B5EF4-FFF2-40B4-BE49-F238E27FC236}">
-                <a16:creationId xmlns:a16="http://schemas.microsoft.com/office/drawing/2014/main" id="{F05BB660-4D91-F54C-BEA6-18441E54DD65}"/>
-              </a:ext>
-            </a:extLst>
-          </p:cNvPr>
-          <p:cNvSpPr/>
-          <p:nvPr/>
-        </p:nvSpPr>
-        <p:spPr>
-          <a:xfrm>
-            <a:off x="782291" y="195354"/>
-            <a:ext cx="10627418" cy="6467292"/>
-          </a:xfrm>
-          <a:prstGeom prst="rect">
-            <a:avLst/>
-          </a:prstGeom>
-          <a:solidFill>
-            <a:srgbClr val="EEEDF1"/>
-          </a:solidFill>
-          <a:ln>
-            <a:noFill/>
-          </a:ln>
-        </p:spPr>
-        <p:style>
-          <a:lnRef idx="2">
-            <a:schemeClr val="accent1">
-              <a:shade val="50000"/>
-            </a:schemeClr>
-          </a:lnRef>
-          <a:fillRef idx="1">
-            <a:schemeClr val="accent1"/>
-          </a:fillRef>
-          <a:effectRef idx="0">
-            <a:schemeClr val="accent1"/>
-          </a:effectRef>
-          <a:fontRef idx="minor">
-            <a:schemeClr val="lt1"/>
-          </a:fontRef>
-        </p:style>
-        <p:txBody>
-          <a:bodyPr rtlCol="0" anchor="ctr"/>
-          <a:lstStyle/>
-          <a:p>
-            <a:pPr algn="ctr"/>
-            <a:endParaRPr lang="en-PH"/>
-          </a:p>
-        </p:txBody>
-      </p:sp>
       <p:grpSp>
         <p:nvGrpSpPr>
-          <p:cNvPr id="47" name="Group 46">
-            <a:extLst>
-              <a:ext uri="{FF2B5EF4-FFF2-40B4-BE49-F238E27FC236}">
-                <a16:creationId xmlns:a16="http://schemas.microsoft.com/office/drawing/2014/main" id="{1EF4F3BB-CF0E-804E-8F68-2461A9D37A56}"/>
+          <p:cNvPr id="6" name="Group 5">
+            <a:extLst>
+              <a:ext uri="{FF2B5EF4-FFF2-40B4-BE49-F238E27FC236}">
+                <a16:creationId xmlns:a16="http://schemas.microsoft.com/office/drawing/2014/main" id="{412A0D1A-214F-EA67-7264-07CF632B9CFF}"/>
               </a:ext>
             </a:extLst>
           </p:cNvPr>
@@ -3644,18 +3592,70 @@
         </p:nvGrpSpPr>
         <p:grpSpPr>
           <a:xfrm>
-            <a:off x="1008069" y="2418155"/>
-            <a:ext cx="2890503" cy="2890503"/>
-            <a:chOff x="878940" y="2088548"/>
-            <a:chExt cx="2890503" cy="2890503"/>
+            <a:off x="782291" y="195354"/>
+            <a:ext cx="10627418" cy="6467292"/>
+            <a:chOff x="782291" y="195354"/>
+            <a:chExt cx="10627418" cy="6467292"/>
           </a:xfrm>
         </p:grpSpPr>
+        <p:sp>
+          <p:nvSpPr>
+            <p:cNvPr id="17" name="Rectangle 16">
+              <a:extLst>
+                <a:ext uri="{FF2B5EF4-FFF2-40B4-BE49-F238E27FC236}">
+                  <a16:creationId xmlns:a16="http://schemas.microsoft.com/office/drawing/2014/main" id="{F05BB660-4D91-F54C-BEA6-18441E54DD65}"/>
+                </a:ext>
+              </a:extLst>
+            </p:cNvPr>
+            <p:cNvSpPr/>
+            <p:nvPr/>
+          </p:nvSpPr>
+          <p:spPr>
+            <a:xfrm>
+              <a:off x="782291" y="195354"/>
+              <a:ext cx="10627418" cy="6467292"/>
+            </a:xfrm>
+            <a:prstGeom prst="rect">
+              <a:avLst/>
+            </a:prstGeom>
+            <a:solidFill>
+              <a:srgbClr val="545454"/>
+            </a:solidFill>
+            <a:ln>
+              <a:noFill/>
+            </a:ln>
+          </p:spPr>
+          <p:style>
+            <a:lnRef idx="2">
+              <a:schemeClr val="accent1">
+                <a:shade val="50000"/>
+              </a:schemeClr>
+            </a:lnRef>
+            <a:fillRef idx="1">
+              <a:schemeClr val="accent1"/>
+            </a:fillRef>
+            <a:effectRef idx="0">
+              <a:schemeClr val="accent1"/>
+            </a:effectRef>
+            <a:fontRef idx="minor">
+              <a:schemeClr val="lt1"/>
+            </a:fontRef>
+          </p:style>
+          <p:txBody>
+            <a:bodyPr rtlCol="0" anchor="ctr"/>
+            <a:lstStyle/>
+            <a:p>
+              <a:pPr algn="ctr"/>
+              <a:endParaRPr lang="en-PH"/>
+            </a:p>
+          </p:txBody>
+        </p:sp>
         <p:grpSp>
           <p:nvGrpSpPr>
-            <p:cNvPr id="43" name="Group 42">
+            <p:cNvPr id="47" name="Group 46">
               <a:extLst>
                 <a:ext uri="{FF2B5EF4-FFF2-40B4-BE49-F238E27FC236}">
-                  <a16:creationId xmlns:a16="http://schemas.microsoft.com/office/drawing/2014/main" id="{46E7029A-ECB2-2832-D4F9-D2A721C99FEA}"/>
+                  <a16:creationId xmlns:a16="http://schemas.microsoft.com/office/drawing/2014/main" id="{1EF4F3BB-CF0E-804E-8F68-2461A9D37A56}"/>
                 </a:ext>
               </a:extLst>
             </p:cNvPr>
@@ -3664,905 +3664,956 @@
           </p:nvGrpSpPr>
           <p:grpSpPr>
             <a:xfrm>
-              <a:off x="1089567" y="2337739"/>
-              <a:ext cx="2517366" cy="1949391"/>
-              <a:chOff x="661512" y="2614241"/>
-              <a:chExt cx="2517366" cy="1949391"/>
+              <a:off x="1008069" y="2418155"/>
+              <a:ext cx="2890503" cy="2890503"/>
+              <a:chOff x="878940" y="2088548"/>
+              <a:chExt cx="2890503" cy="2890503"/>
             </a:xfrm>
           </p:grpSpPr>
-          <p:sp>
-            <p:nvSpPr>
-              <p:cNvPr id="28" name="Rectangle: Rounded Corners 27">
+          <p:grpSp>
+            <p:nvGrpSpPr>
+              <p:cNvPr id="43" name="Group 42">
                 <a:extLst>
                   <a:ext uri="{FF2B5EF4-FFF2-40B4-BE49-F238E27FC236}">
-                    <a16:creationId xmlns:a16="http://schemas.microsoft.com/office/drawing/2014/main" id="{9213CE32-27AC-96A0-225F-7C0F6272F1E2}"/>
+                    <a16:creationId xmlns:a16="http://schemas.microsoft.com/office/drawing/2014/main" id="{46E7029A-ECB2-2832-D4F9-D2A721C99FEA}"/>
                   </a:ext>
                 </a:extLst>
               </p:cNvPr>
-              <p:cNvSpPr/>
+              <p:cNvGrpSpPr/>
               <p:nvPr/>
-            </p:nvSpPr>
-            <p:spPr>
-              <a:xfrm rot="14636450">
-                <a:off x="2524114" y="3249973"/>
-                <a:ext cx="857669" cy="451858"/>
+            </p:nvGrpSpPr>
+            <p:grpSpPr>
+              <a:xfrm>
+                <a:off x="1089567" y="2337739"/>
+                <a:ext cx="2517366" cy="1949391"/>
+                <a:chOff x="661512" y="2614241"/>
+                <a:chExt cx="2517366" cy="1949391"/>
               </a:xfrm>
-              <a:prstGeom prst="roundRect">
-                <a:avLst>
-                  <a:gd name="adj" fmla="val 10003"/>
-                </a:avLst>
-              </a:prstGeom>
-              <a:solidFill>
-                <a:schemeClr val="bg1"/>
-              </a:solidFill>
-              <a:ln>
-                <a:noFill/>
-              </a:ln>
-            </p:spPr>
-            <p:style>
-              <a:lnRef idx="2">
-                <a:schemeClr val="accent1">
-                  <a:shade val="50000"/>
-                </a:schemeClr>
-              </a:lnRef>
-              <a:fillRef idx="1">
-                <a:schemeClr val="accent1"/>
-              </a:fillRef>
-              <a:effectRef idx="0">
-                <a:schemeClr val="accent1"/>
-              </a:effectRef>
-              <a:fontRef idx="minor">
-                <a:schemeClr val="lt1"/>
-              </a:fontRef>
-            </p:style>
-            <p:txBody>
-              <a:bodyPr rtlCol="0" anchor="ctr"/>
-              <a:lstStyle/>
-              <a:p>
-                <a:pPr algn="ctr"/>
-                <a:endParaRPr lang="en-PH"/>
-              </a:p>
-            </p:txBody>
-          </p:sp>
-          <p:sp>
-            <p:nvSpPr>
-              <p:cNvPr id="25" name="Rectangle: Rounded Corners 24">
+            </p:grpSpPr>
+            <p:sp>
+              <p:nvSpPr>
+                <p:cNvPr id="28" name="Rectangle: Rounded Corners 27">
+                  <a:extLst>
+                    <a:ext uri="{FF2B5EF4-FFF2-40B4-BE49-F238E27FC236}">
+                      <a16:creationId xmlns:a16="http://schemas.microsoft.com/office/drawing/2014/main" id="{9213CE32-27AC-96A0-225F-7C0F6272F1E2}"/>
+                    </a:ext>
+                  </a:extLst>
+                </p:cNvPr>
+                <p:cNvSpPr/>
+                <p:nvPr/>
+              </p:nvSpPr>
+              <p:spPr>
+                <a:xfrm rot="14636450">
+                  <a:off x="2524114" y="3249973"/>
+                  <a:ext cx="857669" cy="451858"/>
+                </a:xfrm>
+                <a:prstGeom prst="roundRect">
+                  <a:avLst>
+                    <a:gd name="adj" fmla="val 10003"/>
+                  </a:avLst>
+                </a:prstGeom>
+                <a:solidFill>
+                  <a:schemeClr val="bg1"/>
+                </a:solidFill>
+                <a:ln>
+                  <a:noFill/>
+                </a:ln>
+              </p:spPr>
+              <p:style>
+                <a:lnRef idx="2">
+                  <a:schemeClr val="accent1">
+                    <a:shade val="50000"/>
+                  </a:schemeClr>
+                </a:lnRef>
+                <a:fillRef idx="1">
+                  <a:schemeClr val="accent1"/>
+                </a:fillRef>
+                <a:effectRef idx="0">
+                  <a:schemeClr val="accent1"/>
+                </a:effectRef>
+                <a:fontRef idx="minor">
+                  <a:schemeClr val="lt1"/>
+                </a:fontRef>
+              </p:style>
+              <p:txBody>
+                <a:bodyPr rtlCol="0" anchor="ctr"/>
+                <a:lstStyle/>
+                <a:p>
+                  <a:pPr algn="ctr"/>
+                  <a:endParaRPr lang="en-PH"/>
+                </a:p>
+              </p:txBody>
+            </p:sp>
+            <p:sp>
+              <p:nvSpPr>
+                <p:cNvPr id="25" name="Rectangle: Rounded Corners 24">
+                  <a:extLst>
+                    <a:ext uri="{FF2B5EF4-FFF2-40B4-BE49-F238E27FC236}">
+                      <a16:creationId xmlns:a16="http://schemas.microsoft.com/office/drawing/2014/main" id="{4CDE742F-2E54-ED98-F00A-8379E24EAD01}"/>
+                    </a:ext>
+                  </a:extLst>
+                </p:cNvPr>
+                <p:cNvSpPr/>
+                <p:nvPr/>
+              </p:nvSpPr>
+              <p:spPr>
+                <a:xfrm rot="6926357">
+                  <a:off x="458606" y="3249786"/>
+                  <a:ext cx="857669" cy="451858"/>
+                </a:xfrm>
+                <a:prstGeom prst="roundRect">
+                  <a:avLst>
+                    <a:gd name="adj" fmla="val 10003"/>
+                  </a:avLst>
+                </a:prstGeom>
+                <a:solidFill>
+                  <a:schemeClr val="bg1"/>
+                </a:solidFill>
+                <a:ln>
+                  <a:noFill/>
+                </a:ln>
+              </p:spPr>
+              <p:style>
+                <a:lnRef idx="2">
+                  <a:schemeClr val="accent1">
+                    <a:shade val="50000"/>
+                  </a:schemeClr>
+                </a:lnRef>
+                <a:fillRef idx="1">
+                  <a:schemeClr val="accent1"/>
+                </a:fillRef>
+                <a:effectRef idx="0">
+                  <a:schemeClr val="accent1"/>
+                </a:effectRef>
+                <a:fontRef idx="minor">
+                  <a:schemeClr val="lt1"/>
+                </a:fontRef>
+              </p:style>
+              <p:txBody>
+                <a:bodyPr rtlCol="0" anchor="ctr"/>
+                <a:lstStyle/>
+                <a:p>
+                  <a:pPr algn="ctr"/>
+                  <a:endParaRPr lang="en-PH"/>
+                </a:p>
+              </p:txBody>
+            </p:sp>
+            <p:sp>
+              <p:nvSpPr>
+                <p:cNvPr id="22" name="Rectangle: Rounded Corners 21">
+                  <a:extLst>
+                    <a:ext uri="{FF2B5EF4-FFF2-40B4-BE49-F238E27FC236}">
+                      <a16:creationId xmlns:a16="http://schemas.microsoft.com/office/drawing/2014/main" id="{16CF8D3C-0A5F-69FB-AAE0-949E964FFB4E}"/>
+                    </a:ext>
+                  </a:extLst>
+                </p:cNvPr>
+                <p:cNvSpPr/>
+                <p:nvPr/>
+              </p:nvSpPr>
+              <p:spPr>
+                <a:xfrm rot="7200405">
+                  <a:off x="2268512" y="2934079"/>
+                  <a:ext cx="402863" cy="60810"/>
+                </a:xfrm>
+                <a:prstGeom prst="roundRect">
+                  <a:avLst>
+                    <a:gd name="adj" fmla="val 50000"/>
+                  </a:avLst>
+                </a:prstGeom>
+                <a:solidFill>
+                  <a:schemeClr val="bg1"/>
+                </a:solidFill>
+                <a:ln w="76200">
+                  <a:solidFill>
+                    <a:srgbClr val="50AD51"/>
+                  </a:solidFill>
+                </a:ln>
+              </p:spPr>
+              <p:style>
+                <a:lnRef idx="2">
+                  <a:schemeClr val="accent1">
+                    <a:shade val="50000"/>
+                  </a:schemeClr>
+                </a:lnRef>
+                <a:fillRef idx="1">
+                  <a:schemeClr val="accent1"/>
+                </a:fillRef>
+                <a:effectRef idx="0">
+                  <a:schemeClr val="accent1"/>
+                </a:effectRef>
+                <a:fontRef idx="minor">
+                  <a:schemeClr val="lt1"/>
+                </a:fontRef>
+              </p:style>
+              <p:txBody>
+                <a:bodyPr rtlCol="0" anchor="ctr"/>
+                <a:lstStyle/>
+                <a:p>
+                  <a:pPr algn="ctr"/>
+                  <a:endParaRPr lang="en-PH"/>
+                </a:p>
+              </p:txBody>
+            </p:sp>
+            <p:sp>
+              <p:nvSpPr>
+                <p:cNvPr id="23" name="Rectangle: Rounded Corners 22">
+                  <a:extLst>
+                    <a:ext uri="{FF2B5EF4-FFF2-40B4-BE49-F238E27FC236}">
+                      <a16:creationId xmlns:a16="http://schemas.microsoft.com/office/drawing/2014/main" id="{95989034-4E06-2F86-3D4A-EDC7FD15A1D2}"/>
+                    </a:ext>
+                  </a:extLst>
+                </p:cNvPr>
+                <p:cNvSpPr/>
+                <p:nvPr/>
+              </p:nvSpPr>
+              <p:spPr>
+                <a:xfrm rot="3568225">
+                  <a:off x="1228248" y="2930524"/>
+                  <a:ext cx="402863" cy="60810"/>
+                </a:xfrm>
+                <a:prstGeom prst="roundRect">
+                  <a:avLst>
+                    <a:gd name="adj" fmla="val 50000"/>
+                  </a:avLst>
+                </a:prstGeom>
+                <a:solidFill>
+                  <a:schemeClr val="bg1"/>
+                </a:solidFill>
+                <a:ln w="76200">
+                  <a:solidFill>
+                    <a:srgbClr val="50AD51"/>
+                  </a:solidFill>
+                </a:ln>
+              </p:spPr>
+              <p:style>
+                <a:lnRef idx="2">
+                  <a:schemeClr val="accent1">
+                    <a:shade val="50000"/>
+                  </a:schemeClr>
+                </a:lnRef>
+                <a:fillRef idx="1">
+                  <a:schemeClr val="accent1"/>
+                </a:fillRef>
+                <a:effectRef idx="0">
+                  <a:schemeClr val="accent1"/>
+                </a:effectRef>
+                <a:fontRef idx="minor">
+                  <a:schemeClr val="lt1"/>
+                </a:fontRef>
+              </p:style>
+              <p:txBody>
+                <a:bodyPr rtlCol="0" anchor="ctr"/>
+                <a:lstStyle/>
+                <a:p>
+                  <a:pPr algn="ctr"/>
+                  <a:endParaRPr lang="en-PH" dirty="0"/>
+                </a:p>
+              </p:txBody>
+            </p:sp>
+            <p:sp>
+              <p:nvSpPr>
+                <p:cNvPr id="24" name="Rectangle: Rounded Corners 23">
+                  <a:extLst>
+                    <a:ext uri="{FF2B5EF4-FFF2-40B4-BE49-F238E27FC236}">
+                      <a16:creationId xmlns:a16="http://schemas.microsoft.com/office/drawing/2014/main" id="{87F40CD9-9415-CE08-ACDE-1A552B3FD481}"/>
+                    </a:ext>
+                  </a:extLst>
+                </p:cNvPr>
+                <p:cNvSpPr/>
+                <p:nvPr/>
+              </p:nvSpPr>
+              <p:spPr>
+                <a:xfrm rot="5400000">
+                  <a:off x="1752151" y="2785268"/>
+                  <a:ext cx="402863" cy="60810"/>
+                </a:xfrm>
+                <a:prstGeom prst="roundRect">
+                  <a:avLst>
+                    <a:gd name="adj" fmla="val 50000"/>
+                  </a:avLst>
+                </a:prstGeom>
+                <a:solidFill>
+                  <a:schemeClr val="bg1"/>
+                </a:solidFill>
+                <a:ln w="76200">
+                  <a:solidFill>
+                    <a:srgbClr val="50AD51"/>
+                  </a:solidFill>
+                </a:ln>
+              </p:spPr>
+              <p:style>
+                <a:lnRef idx="2">
+                  <a:schemeClr val="accent1">
+                    <a:shade val="50000"/>
+                  </a:schemeClr>
+                </a:lnRef>
+                <a:fillRef idx="1">
+                  <a:schemeClr val="accent1"/>
+                </a:fillRef>
+                <a:effectRef idx="0">
+                  <a:schemeClr val="accent1"/>
+                </a:effectRef>
+                <a:fontRef idx="minor">
+                  <a:schemeClr val="lt1"/>
+                </a:fontRef>
+              </p:style>
+              <p:txBody>
+                <a:bodyPr rtlCol="0" anchor="ctr"/>
+                <a:lstStyle/>
+                <a:p>
+                  <a:pPr algn="ctr"/>
+                  <a:endParaRPr lang="en-PH" dirty="0"/>
+                </a:p>
+              </p:txBody>
+            </p:sp>
+            <p:sp>
+              <p:nvSpPr>
+                <p:cNvPr id="29" name="Rectangle: Rounded Corners 28">
+                  <a:extLst>
+                    <a:ext uri="{FF2B5EF4-FFF2-40B4-BE49-F238E27FC236}">
+                      <a16:creationId xmlns:a16="http://schemas.microsoft.com/office/drawing/2014/main" id="{65574EC7-F468-CBA4-BF8A-34686FBF711E}"/>
+                    </a:ext>
+                  </a:extLst>
+                </p:cNvPr>
+                <p:cNvSpPr/>
+                <p:nvPr/>
+              </p:nvSpPr>
+              <p:spPr>
+                <a:xfrm rot="13431481">
+                  <a:off x="1242448" y="3976789"/>
+                  <a:ext cx="781792" cy="451858"/>
+                </a:xfrm>
+                <a:prstGeom prst="roundRect">
+                  <a:avLst>
+                    <a:gd name="adj" fmla="val 10003"/>
+                  </a:avLst>
+                </a:prstGeom>
+                <a:solidFill>
+                  <a:schemeClr val="bg1"/>
+                </a:solidFill>
+                <a:ln>
+                  <a:noFill/>
+                </a:ln>
+              </p:spPr>
+              <p:style>
+                <a:lnRef idx="2">
+                  <a:schemeClr val="accent1">
+                    <a:shade val="50000"/>
+                  </a:schemeClr>
+                </a:lnRef>
+                <a:fillRef idx="1">
+                  <a:schemeClr val="accent1"/>
+                </a:fillRef>
+                <a:effectRef idx="0">
+                  <a:schemeClr val="accent1"/>
+                </a:effectRef>
+                <a:fontRef idx="minor">
+                  <a:schemeClr val="lt1"/>
+                </a:fontRef>
+              </p:style>
+              <p:txBody>
+                <a:bodyPr rtlCol="0" anchor="ctr"/>
+                <a:lstStyle/>
+                <a:p>
+                  <a:pPr algn="ctr"/>
+                  <a:endParaRPr lang="en-PH"/>
+                </a:p>
+              </p:txBody>
+            </p:sp>
+            <p:sp>
+              <p:nvSpPr>
+                <p:cNvPr id="30" name="Rectangle: Rounded Corners 29">
+                  <a:extLst>
+                    <a:ext uri="{FF2B5EF4-FFF2-40B4-BE49-F238E27FC236}">
+                      <a16:creationId xmlns:a16="http://schemas.microsoft.com/office/drawing/2014/main" id="{191065B8-BB3D-D03C-4877-AA72DEFFC19B}"/>
+                    </a:ext>
+                  </a:extLst>
+                </p:cNvPr>
+                <p:cNvSpPr/>
+                <p:nvPr/>
+              </p:nvSpPr>
+              <p:spPr>
+                <a:xfrm rot="8077846">
+                  <a:off x="1769000" y="3933436"/>
+                  <a:ext cx="808535" cy="451858"/>
+                </a:xfrm>
+                <a:prstGeom prst="roundRect">
+                  <a:avLst>
+                    <a:gd name="adj" fmla="val 10003"/>
+                  </a:avLst>
+                </a:prstGeom>
+                <a:solidFill>
+                  <a:schemeClr val="bg1"/>
+                </a:solidFill>
+                <a:ln>
+                  <a:noFill/>
+                </a:ln>
+              </p:spPr>
+              <p:style>
+                <a:lnRef idx="2">
+                  <a:schemeClr val="accent1">
+                    <a:shade val="50000"/>
+                  </a:schemeClr>
+                </a:lnRef>
+                <a:fillRef idx="1">
+                  <a:schemeClr val="accent1"/>
+                </a:fillRef>
+                <a:effectRef idx="0">
+                  <a:schemeClr val="accent1"/>
+                </a:effectRef>
+                <a:fontRef idx="minor">
+                  <a:schemeClr val="lt1"/>
+                </a:fontRef>
+              </p:style>
+              <p:txBody>
+                <a:bodyPr rtlCol="0" anchor="ctr"/>
+                <a:lstStyle/>
+                <a:p>
+                  <a:pPr algn="ctr"/>
+                  <a:endParaRPr lang="en-PH" dirty="0"/>
+                </a:p>
+              </p:txBody>
+            </p:sp>
+            <p:sp>
+              <p:nvSpPr>
+                <p:cNvPr id="31" name="Rectangle: Rounded Corners 30">
+                  <a:extLst>
+                    <a:ext uri="{FF2B5EF4-FFF2-40B4-BE49-F238E27FC236}">
+                      <a16:creationId xmlns:a16="http://schemas.microsoft.com/office/drawing/2014/main" id="{BE647FF3-FE7F-83A0-579D-DAD48807D350}"/>
+                    </a:ext>
+                  </a:extLst>
+                </p:cNvPr>
+                <p:cNvSpPr/>
+                <p:nvPr/>
+              </p:nvSpPr>
+              <p:spPr>
+                <a:xfrm rot="8603330">
+                  <a:off x="2059647" y="3977654"/>
+                  <a:ext cx="640687" cy="357820"/>
+                </a:xfrm>
+                <a:prstGeom prst="roundRect">
+                  <a:avLst>
+                    <a:gd name="adj" fmla="val 10003"/>
+                  </a:avLst>
+                </a:prstGeom>
+                <a:solidFill>
+                  <a:schemeClr val="bg1"/>
+                </a:solidFill>
+                <a:ln>
+                  <a:noFill/>
+                </a:ln>
+              </p:spPr>
+              <p:style>
+                <a:lnRef idx="2">
+                  <a:schemeClr val="accent1">
+                    <a:shade val="50000"/>
+                  </a:schemeClr>
+                </a:lnRef>
+                <a:fillRef idx="1">
+                  <a:schemeClr val="accent1"/>
+                </a:fillRef>
+                <a:effectRef idx="0">
+                  <a:schemeClr val="accent1"/>
+                </a:effectRef>
+                <a:fontRef idx="minor">
+                  <a:schemeClr val="lt1"/>
+                </a:fontRef>
+              </p:style>
+              <p:txBody>
+                <a:bodyPr rtlCol="0" anchor="ctr"/>
+                <a:lstStyle/>
+                <a:p>
+                  <a:pPr algn="ctr"/>
+                  <a:endParaRPr lang="en-PH"/>
+                </a:p>
+              </p:txBody>
+            </p:sp>
+            <p:sp>
+              <p:nvSpPr>
+                <p:cNvPr id="37" name="Rectangle: Rounded Corners 36">
+                  <a:extLst>
+                    <a:ext uri="{FF2B5EF4-FFF2-40B4-BE49-F238E27FC236}">
+                      <a16:creationId xmlns:a16="http://schemas.microsoft.com/office/drawing/2014/main" id="{5E06DD57-B8BF-9D88-2F6C-6D5181DF398F}"/>
+                    </a:ext>
+                  </a:extLst>
+                </p:cNvPr>
+                <p:cNvSpPr/>
+                <p:nvPr/>
+              </p:nvSpPr>
+              <p:spPr>
+                <a:xfrm rot="10800000">
+                  <a:off x="960697" y="3345654"/>
+                  <a:ext cx="1934901" cy="516691"/>
+                </a:xfrm>
+                <a:prstGeom prst="roundRect">
+                  <a:avLst>
+                    <a:gd name="adj" fmla="val 10003"/>
+                  </a:avLst>
+                </a:prstGeom>
+                <a:solidFill>
+                  <a:schemeClr val="bg1"/>
+                </a:solidFill>
+                <a:ln>
+                  <a:noFill/>
+                </a:ln>
+              </p:spPr>
+              <p:style>
+                <a:lnRef idx="2">
+                  <a:schemeClr val="accent1">
+                    <a:shade val="50000"/>
+                  </a:schemeClr>
+                </a:lnRef>
+                <a:fillRef idx="1">
+                  <a:schemeClr val="accent1"/>
+                </a:fillRef>
+                <a:effectRef idx="0">
+                  <a:schemeClr val="accent1"/>
+                </a:effectRef>
+                <a:fontRef idx="minor">
+                  <a:schemeClr val="lt1"/>
+                </a:fontRef>
+              </p:style>
+              <p:txBody>
+                <a:bodyPr rtlCol="0" anchor="ctr"/>
+                <a:lstStyle/>
+                <a:p>
+                  <a:pPr algn="ctr"/>
+                  <a:endParaRPr lang="en-PH"/>
+                </a:p>
+              </p:txBody>
+            </p:sp>
+            <p:sp>
+              <p:nvSpPr>
+                <p:cNvPr id="38" name="Rectangle: Rounded Corners 37">
+                  <a:extLst>
+                    <a:ext uri="{FF2B5EF4-FFF2-40B4-BE49-F238E27FC236}">
+                      <a16:creationId xmlns:a16="http://schemas.microsoft.com/office/drawing/2014/main" id="{B9A3F5F9-6572-3535-E108-C35BD3EE4DF5}"/>
+                    </a:ext>
+                  </a:extLst>
+                </p:cNvPr>
+                <p:cNvSpPr/>
+                <p:nvPr/>
+              </p:nvSpPr>
+              <p:spPr>
+                <a:xfrm rot="10800000">
+                  <a:off x="1274412" y="3648851"/>
+                  <a:ext cx="1350500" cy="516691"/>
+                </a:xfrm>
+                <a:prstGeom prst="roundRect">
+                  <a:avLst>
+                    <a:gd name="adj" fmla="val 10003"/>
+                  </a:avLst>
+                </a:prstGeom>
+                <a:solidFill>
+                  <a:schemeClr val="bg1"/>
+                </a:solidFill>
+                <a:ln>
+                  <a:noFill/>
+                </a:ln>
+              </p:spPr>
+              <p:style>
+                <a:lnRef idx="2">
+                  <a:schemeClr val="accent1">
+                    <a:shade val="50000"/>
+                  </a:schemeClr>
+                </a:lnRef>
+                <a:fillRef idx="1">
+                  <a:schemeClr val="accent1"/>
+                </a:fillRef>
+                <a:effectRef idx="0">
+                  <a:schemeClr val="accent1"/>
+                </a:effectRef>
+                <a:fontRef idx="minor">
+                  <a:schemeClr val="lt1"/>
+                </a:fontRef>
+              </p:style>
+              <p:txBody>
+                <a:bodyPr rtlCol="0" anchor="ctr"/>
+                <a:lstStyle/>
+                <a:p>
+                  <a:pPr algn="ctr"/>
+                  <a:endParaRPr lang="en-PH"/>
+                </a:p>
+              </p:txBody>
+            </p:sp>
+            <p:sp>
+              <p:nvSpPr>
+                <p:cNvPr id="39" name="Rectangle: Rounded Corners 38">
+                  <a:extLst>
+                    <a:ext uri="{FF2B5EF4-FFF2-40B4-BE49-F238E27FC236}">
+                      <a16:creationId xmlns:a16="http://schemas.microsoft.com/office/drawing/2014/main" id="{438FBCC2-121C-B4B1-F9D0-9388450CA7ED}"/>
+                    </a:ext>
+                  </a:extLst>
+                </p:cNvPr>
+                <p:cNvSpPr/>
+                <p:nvPr/>
+              </p:nvSpPr>
+              <p:spPr>
+                <a:xfrm rot="12689537">
+                  <a:off x="991528" y="3751878"/>
+                  <a:ext cx="759353" cy="332139"/>
+                </a:xfrm>
+                <a:prstGeom prst="roundRect">
+                  <a:avLst>
+                    <a:gd name="adj" fmla="val 10003"/>
+                  </a:avLst>
+                </a:prstGeom>
+                <a:solidFill>
+                  <a:schemeClr val="bg1"/>
+                </a:solidFill>
+                <a:ln>
+                  <a:noFill/>
+                </a:ln>
+              </p:spPr>
+              <p:style>
+                <a:lnRef idx="2">
+                  <a:schemeClr val="accent1">
+                    <a:shade val="50000"/>
+                  </a:schemeClr>
+                </a:lnRef>
+                <a:fillRef idx="1">
+                  <a:schemeClr val="accent1"/>
+                </a:fillRef>
+                <a:effectRef idx="0">
+                  <a:schemeClr val="accent1"/>
+                </a:effectRef>
+                <a:fontRef idx="minor">
+                  <a:schemeClr val="lt1"/>
+                </a:fontRef>
+              </p:style>
+              <p:txBody>
+                <a:bodyPr rtlCol="0" anchor="ctr"/>
+                <a:lstStyle/>
+                <a:p>
+                  <a:pPr algn="ctr"/>
+                  <a:endParaRPr lang="en-PH"/>
+                </a:p>
+              </p:txBody>
+            </p:sp>
+            <p:sp>
+              <p:nvSpPr>
+                <p:cNvPr id="40" name="Rectangle: Rounded Corners 39">
+                  <a:extLst>
+                    <a:ext uri="{FF2B5EF4-FFF2-40B4-BE49-F238E27FC236}">
+                      <a16:creationId xmlns:a16="http://schemas.microsoft.com/office/drawing/2014/main" id="{E95715C2-554B-4EC8-9F04-BB8D8A5815A3}"/>
+                    </a:ext>
+                  </a:extLst>
+                </p:cNvPr>
+                <p:cNvSpPr/>
+                <p:nvPr/>
+              </p:nvSpPr>
+              <p:spPr>
+                <a:xfrm rot="8332915">
+                  <a:off x="2444354" y="3686246"/>
+                  <a:ext cx="374707" cy="332139"/>
+                </a:xfrm>
+                <a:prstGeom prst="roundRect">
+                  <a:avLst>
+                    <a:gd name="adj" fmla="val 10003"/>
+                  </a:avLst>
+                </a:prstGeom>
+                <a:solidFill>
+                  <a:schemeClr val="bg1"/>
+                </a:solidFill>
+                <a:ln>
+                  <a:noFill/>
+                </a:ln>
+              </p:spPr>
+              <p:style>
+                <a:lnRef idx="2">
+                  <a:schemeClr val="accent1">
+                    <a:shade val="50000"/>
+                  </a:schemeClr>
+                </a:lnRef>
+                <a:fillRef idx="1">
+                  <a:schemeClr val="accent1"/>
+                </a:fillRef>
+                <a:effectRef idx="0">
+                  <a:schemeClr val="accent1"/>
+                </a:effectRef>
+                <a:fontRef idx="minor">
+                  <a:schemeClr val="lt1"/>
+                </a:fontRef>
+              </p:style>
+              <p:txBody>
+                <a:bodyPr rtlCol="0" anchor="ctr"/>
+                <a:lstStyle/>
+                <a:p>
+                  <a:pPr algn="ctr"/>
+                  <a:endParaRPr lang="en-PH" dirty="0"/>
+                </a:p>
+              </p:txBody>
+            </p:sp>
+            <p:sp>
+              <p:nvSpPr>
+                <p:cNvPr id="41" name="Rectangle: Rounded Corners 40">
+                  <a:extLst>
+                    <a:ext uri="{FF2B5EF4-FFF2-40B4-BE49-F238E27FC236}">
+                      <a16:creationId xmlns:a16="http://schemas.microsoft.com/office/drawing/2014/main" id="{7D63E209-D279-9397-80EA-218EAF78EF47}"/>
+                    </a:ext>
+                  </a:extLst>
+                </p:cNvPr>
+                <p:cNvSpPr/>
+                <p:nvPr/>
+              </p:nvSpPr>
+              <p:spPr>
+                <a:xfrm rot="10800000">
+                  <a:off x="1841043" y="3301250"/>
+                  <a:ext cx="350216" cy="88808"/>
+                </a:xfrm>
+                <a:prstGeom prst="roundRect">
+                  <a:avLst>
+                    <a:gd name="adj" fmla="val 10003"/>
+                  </a:avLst>
+                </a:prstGeom>
+                <a:solidFill>
+                  <a:schemeClr val="bg1"/>
+                </a:solidFill>
+                <a:ln>
+                  <a:noFill/>
+                </a:ln>
+              </p:spPr>
+              <p:style>
+                <a:lnRef idx="2">
+                  <a:schemeClr val="accent1">
+                    <a:shade val="50000"/>
+                  </a:schemeClr>
+                </a:lnRef>
+                <a:fillRef idx="1">
+                  <a:schemeClr val="accent1"/>
+                </a:fillRef>
+                <a:effectRef idx="0">
+                  <a:schemeClr val="accent1"/>
+                </a:effectRef>
+                <a:fontRef idx="minor">
+                  <a:schemeClr val="lt1"/>
+                </a:fontRef>
+              </p:style>
+              <p:txBody>
+                <a:bodyPr rtlCol="0" anchor="ctr"/>
+                <a:lstStyle/>
+                <a:p>
+                  <a:pPr algn="ctr"/>
+                  <a:endParaRPr lang="en-PH" dirty="0"/>
+                </a:p>
+              </p:txBody>
+            </p:sp>
+          </p:grpSp>
+          <p:pic>
+            <p:nvPicPr>
+              <p:cNvPr id="15" name="Picture 14">
                 <a:extLst>
                   <a:ext uri="{FF2B5EF4-FFF2-40B4-BE49-F238E27FC236}">
-                    <a16:creationId xmlns:a16="http://schemas.microsoft.com/office/drawing/2014/main" id="{4CDE742F-2E54-ED98-F00A-8379E24EAD01}"/>
+                    <a16:creationId xmlns:a16="http://schemas.microsoft.com/office/drawing/2014/main" id="{EEF907CC-CBC6-34A5-4A31-E64E8068E4C0}"/>
                   </a:ext>
                 </a:extLst>
               </p:cNvPr>
-              <p:cNvSpPr/>
+              <p:cNvPicPr>
+                <a:picLocks noChangeAspect="1"/>
+              </p:cNvPicPr>
               <p:nvPr/>
-            </p:nvSpPr>
-            <p:spPr>
-              <a:xfrm rot="6926357">
-                <a:off x="458606" y="3249786"/>
-                <a:ext cx="857669" cy="451858"/>
-              </a:xfrm>
-              <a:prstGeom prst="roundRect">
-                <a:avLst>
-                  <a:gd name="adj" fmla="val 10003"/>
-                </a:avLst>
-              </a:prstGeom>
-              <a:solidFill>
-                <a:schemeClr val="bg1"/>
-              </a:solidFill>
-              <a:ln>
-                <a:noFill/>
-              </a:ln>
-            </p:spPr>
-            <p:style>
-              <a:lnRef idx="2">
-                <a:schemeClr val="accent1">
-                  <a:shade val="50000"/>
-                </a:schemeClr>
-              </a:lnRef>
-              <a:fillRef idx="1">
-                <a:schemeClr val="accent1"/>
-              </a:fillRef>
-              <a:effectRef idx="0">
-                <a:schemeClr val="accent1"/>
-              </a:effectRef>
-              <a:fontRef idx="minor">
-                <a:schemeClr val="lt1"/>
-              </a:fontRef>
-            </p:style>
-            <p:txBody>
-              <a:bodyPr rtlCol="0" anchor="ctr"/>
-              <a:lstStyle/>
-              <a:p>
-                <a:pPr algn="ctr"/>
-                <a:endParaRPr lang="en-PH"/>
-              </a:p>
-            </p:txBody>
-          </p:sp>
-          <p:sp>
-            <p:nvSpPr>
-              <p:cNvPr id="22" name="Rectangle: Rounded Corners 21">
+            </p:nvPicPr>
+            <p:blipFill>
+              <a:blip r:embed="rId2">
+                <a:duotone>
+                  <a:prstClr val="black"/>
+                  <a:srgbClr val="43FF47">
+                    <a:tint val="45000"/>
+                    <a:satMod val="400000"/>
+                  </a:srgbClr>
+                </a:duotone>
                 <a:extLst>
-                  <a:ext uri="{FF2B5EF4-FFF2-40B4-BE49-F238E27FC236}">
-                    <a16:creationId xmlns:a16="http://schemas.microsoft.com/office/drawing/2014/main" id="{16CF8D3C-0A5F-69FB-AAE0-949E964FFB4E}"/>
+                  <a:ext uri="{BEBA8EAE-BF5A-486C-A8C5-ECC9F3942E4B}">
+                    <a14:imgProps xmlns:a14="http://schemas.microsoft.com/office/drawing/2010/main">
+                      <a14:imgLayer r:embed="rId3">
+                        <a14:imgEffect>
+                          <a14:sharpenSoften amount="50000"/>
+                        </a14:imgEffect>
+                        <a14:imgEffect>
+                          <a14:colorTemperature colorTemp="7200"/>
+                        </a14:imgEffect>
+                        <a14:imgEffect>
+                          <a14:saturation sat="200000"/>
+                        </a14:imgEffect>
+                        <a14:imgEffect>
+                          <a14:brightnessContrast bright="20000" contrast="-40000"/>
+                        </a14:imgEffect>
+                      </a14:imgLayer>
+                    </a14:imgProps>
                   </a:ext>
                 </a:extLst>
-              </p:cNvPr>
-              <p:cNvSpPr/>
-              <p:nvPr/>
-            </p:nvSpPr>
+              </a:blip>
+              <a:stretch>
+                <a:fillRect/>
+              </a:stretch>
+            </p:blipFill>
             <p:spPr>
-              <a:xfrm rot="7200405">
-                <a:off x="2268512" y="2934079"/>
-                <a:ext cx="402863" cy="60810"/>
+              <a:xfrm>
+                <a:off x="878940" y="2088548"/>
+                <a:ext cx="2890503" cy="2890503"/>
               </a:xfrm>
-              <a:prstGeom prst="roundRect">
-                <a:avLst>
-                  <a:gd name="adj" fmla="val 50000"/>
-                </a:avLst>
+              <a:prstGeom prst="rect">
+                <a:avLst/>
               </a:prstGeom>
-              <a:solidFill>
-                <a:schemeClr val="bg1"/>
-              </a:solidFill>
-              <a:ln w="76200">
-                <a:solidFill>
-                  <a:srgbClr val="50AD51"/>
-                </a:solidFill>
-              </a:ln>
             </p:spPr>
-            <p:style>
-              <a:lnRef idx="2">
-                <a:schemeClr val="accent1">
-                  <a:shade val="50000"/>
-                </a:schemeClr>
-              </a:lnRef>
-              <a:fillRef idx="1">
-                <a:schemeClr val="accent1"/>
-              </a:fillRef>
-              <a:effectRef idx="0">
-                <a:schemeClr val="accent1"/>
-              </a:effectRef>
-              <a:fontRef idx="minor">
-                <a:schemeClr val="lt1"/>
-              </a:fontRef>
-            </p:style>
-            <p:txBody>
-              <a:bodyPr rtlCol="0" anchor="ctr"/>
-              <a:lstStyle/>
-              <a:p>
-                <a:pPr algn="ctr"/>
-                <a:endParaRPr lang="en-PH"/>
-              </a:p>
-            </p:txBody>
-          </p:sp>
-          <p:sp>
-            <p:nvSpPr>
-              <p:cNvPr id="23" name="Rectangle: Rounded Corners 22">
-                <a:extLst>
-                  <a:ext uri="{FF2B5EF4-FFF2-40B4-BE49-F238E27FC236}">
-                    <a16:creationId xmlns:a16="http://schemas.microsoft.com/office/drawing/2014/main" id="{95989034-4E06-2F86-3D4A-EDC7FD15A1D2}"/>
-                  </a:ext>
-                </a:extLst>
-              </p:cNvPr>
-              <p:cNvSpPr/>
-              <p:nvPr/>
-            </p:nvSpPr>
-            <p:spPr>
-              <a:xfrm rot="3568225">
-                <a:off x="1228248" y="2930524"/>
-                <a:ext cx="402863" cy="60810"/>
-              </a:xfrm>
-              <a:prstGeom prst="roundRect">
-                <a:avLst>
-                  <a:gd name="adj" fmla="val 50000"/>
-                </a:avLst>
-              </a:prstGeom>
-              <a:solidFill>
-                <a:schemeClr val="bg1"/>
-              </a:solidFill>
-              <a:ln w="76200">
-                <a:solidFill>
-                  <a:srgbClr val="50AD51"/>
-                </a:solidFill>
-              </a:ln>
-            </p:spPr>
-            <p:style>
-              <a:lnRef idx="2">
-                <a:schemeClr val="accent1">
-                  <a:shade val="50000"/>
-                </a:schemeClr>
-              </a:lnRef>
-              <a:fillRef idx="1">
-                <a:schemeClr val="accent1"/>
-              </a:fillRef>
-              <a:effectRef idx="0">
-                <a:schemeClr val="accent1"/>
-              </a:effectRef>
-              <a:fontRef idx="minor">
-                <a:schemeClr val="lt1"/>
-              </a:fontRef>
-            </p:style>
-            <p:txBody>
-              <a:bodyPr rtlCol="0" anchor="ctr"/>
-              <a:lstStyle/>
-              <a:p>
-                <a:pPr algn="ctr"/>
-                <a:endParaRPr lang="en-PH" dirty="0"/>
-              </a:p>
-            </p:txBody>
-          </p:sp>
-          <p:sp>
-            <p:nvSpPr>
-              <p:cNvPr id="24" name="Rectangle: Rounded Corners 23">
-                <a:extLst>
-                  <a:ext uri="{FF2B5EF4-FFF2-40B4-BE49-F238E27FC236}">
-                    <a16:creationId xmlns:a16="http://schemas.microsoft.com/office/drawing/2014/main" id="{87F40CD9-9415-CE08-ACDE-1A552B3FD481}"/>
-                  </a:ext>
-                </a:extLst>
-              </p:cNvPr>
-              <p:cNvSpPr/>
-              <p:nvPr/>
-            </p:nvSpPr>
-            <p:spPr>
-              <a:xfrm rot="5400000">
-                <a:off x="1752151" y="2785268"/>
-                <a:ext cx="402863" cy="60810"/>
-              </a:xfrm>
-              <a:prstGeom prst="roundRect">
-                <a:avLst>
-                  <a:gd name="adj" fmla="val 50000"/>
-                </a:avLst>
-              </a:prstGeom>
-              <a:solidFill>
-                <a:schemeClr val="bg1"/>
-              </a:solidFill>
-              <a:ln w="76200">
-                <a:solidFill>
-                  <a:srgbClr val="50AD51"/>
-                </a:solidFill>
-              </a:ln>
-            </p:spPr>
-            <p:style>
-              <a:lnRef idx="2">
-                <a:schemeClr val="accent1">
-                  <a:shade val="50000"/>
-                </a:schemeClr>
-              </a:lnRef>
-              <a:fillRef idx="1">
-                <a:schemeClr val="accent1"/>
-              </a:fillRef>
-              <a:effectRef idx="0">
-                <a:schemeClr val="accent1"/>
-              </a:effectRef>
-              <a:fontRef idx="minor">
-                <a:schemeClr val="lt1"/>
-              </a:fontRef>
-            </p:style>
-            <p:txBody>
-              <a:bodyPr rtlCol="0" anchor="ctr"/>
-              <a:lstStyle/>
-              <a:p>
-                <a:pPr algn="ctr"/>
-                <a:endParaRPr lang="en-PH" dirty="0"/>
-              </a:p>
-            </p:txBody>
-          </p:sp>
-          <p:sp>
-            <p:nvSpPr>
-              <p:cNvPr id="29" name="Rectangle: Rounded Corners 28">
-                <a:extLst>
-                  <a:ext uri="{FF2B5EF4-FFF2-40B4-BE49-F238E27FC236}">
-                    <a16:creationId xmlns:a16="http://schemas.microsoft.com/office/drawing/2014/main" id="{65574EC7-F468-CBA4-BF8A-34686FBF711E}"/>
-                  </a:ext>
-                </a:extLst>
-              </p:cNvPr>
-              <p:cNvSpPr/>
-              <p:nvPr/>
-            </p:nvSpPr>
-            <p:spPr>
-              <a:xfrm rot="13431481">
-                <a:off x="1242448" y="3976789"/>
-                <a:ext cx="781792" cy="451858"/>
-              </a:xfrm>
-              <a:prstGeom prst="roundRect">
-                <a:avLst>
-                  <a:gd name="adj" fmla="val 10003"/>
-                </a:avLst>
-              </a:prstGeom>
-              <a:solidFill>
-                <a:schemeClr val="bg1"/>
-              </a:solidFill>
-              <a:ln>
-                <a:noFill/>
-              </a:ln>
-            </p:spPr>
-            <p:style>
-              <a:lnRef idx="2">
-                <a:schemeClr val="accent1">
-                  <a:shade val="50000"/>
-                </a:schemeClr>
-              </a:lnRef>
-              <a:fillRef idx="1">
-                <a:schemeClr val="accent1"/>
-              </a:fillRef>
-              <a:effectRef idx="0">
-                <a:schemeClr val="accent1"/>
-              </a:effectRef>
-              <a:fontRef idx="minor">
-                <a:schemeClr val="lt1"/>
-              </a:fontRef>
-            </p:style>
-            <p:txBody>
-              <a:bodyPr rtlCol="0" anchor="ctr"/>
-              <a:lstStyle/>
-              <a:p>
-                <a:pPr algn="ctr"/>
-                <a:endParaRPr lang="en-PH"/>
-              </a:p>
-            </p:txBody>
-          </p:sp>
-          <p:sp>
-            <p:nvSpPr>
-              <p:cNvPr id="30" name="Rectangle: Rounded Corners 29">
-                <a:extLst>
-                  <a:ext uri="{FF2B5EF4-FFF2-40B4-BE49-F238E27FC236}">
-                    <a16:creationId xmlns:a16="http://schemas.microsoft.com/office/drawing/2014/main" id="{191065B8-BB3D-D03C-4877-AA72DEFFC19B}"/>
-                  </a:ext>
-                </a:extLst>
-              </p:cNvPr>
-              <p:cNvSpPr/>
-              <p:nvPr/>
-            </p:nvSpPr>
-            <p:spPr>
-              <a:xfrm rot="8077846">
-                <a:off x="1769000" y="3933436"/>
-                <a:ext cx="808535" cy="451858"/>
-              </a:xfrm>
-              <a:prstGeom prst="roundRect">
-                <a:avLst>
-                  <a:gd name="adj" fmla="val 10003"/>
-                </a:avLst>
-              </a:prstGeom>
-              <a:solidFill>
-                <a:schemeClr val="bg1"/>
-              </a:solidFill>
-              <a:ln>
-                <a:noFill/>
-              </a:ln>
-            </p:spPr>
-            <p:style>
-              <a:lnRef idx="2">
-                <a:schemeClr val="accent1">
-                  <a:shade val="50000"/>
-                </a:schemeClr>
-              </a:lnRef>
-              <a:fillRef idx="1">
-                <a:schemeClr val="accent1"/>
-              </a:fillRef>
-              <a:effectRef idx="0">
-                <a:schemeClr val="accent1"/>
-              </a:effectRef>
-              <a:fontRef idx="minor">
-                <a:schemeClr val="lt1"/>
-              </a:fontRef>
-            </p:style>
-            <p:txBody>
-              <a:bodyPr rtlCol="0" anchor="ctr"/>
-              <a:lstStyle/>
-              <a:p>
-                <a:pPr algn="ctr"/>
-                <a:endParaRPr lang="en-PH" dirty="0"/>
-              </a:p>
-            </p:txBody>
-          </p:sp>
-          <p:sp>
-            <p:nvSpPr>
-              <p:cNvPr id="31" name="Rectangle: Rounded Corners 30">
-                <a:extLst>
-                  <a:ext uri="{FF2B5EF4-FFF2-40B4-BE49-F238E27FC236}">
-                    <a16:creationId xmlns:a16="http://schemas.microsoft.com/office/drawing/2014/main" id="{BE647FF3-FE7F-83A0-579D-DAD48807D350}"/>
-                  </a:ext>
-                </a:extLst>
-              </p:cNvPr>
-              <p:cNvSpPr/>
-              <p:nvPr/>
-            </p:nvSpPr>
-            <p:spPr>
-              <a:xfrm rot="8603330">
-                <a:off x="2059647" y="3977654"/>
-                <a:ext cx="640687" cy="357820"/>
-              </a:xfrm>
-              <a:prstGeom prst="roundRect">
-                <a:avLst>
-                  <a:gd name="adj" fmla="val 10003"/>
-                </a:avLst>
-              </a:prstGeom>
-              <a:solidFill>
-                <a:schemeClr val="bg1"/>
-              </a:solidFill>
-              <a:ln>
-                <a:noFill/>
-              </a:ln>
-            </p:spPr>
-            <p:style>
-              <a:lnRef idx="2">
-                <a:schemeClr val="accent1">
-                  <a:shade val="50000"/>
-                </a:schemeClr>
-              </a:lnRef>
-              <a:fillRef idx="1">
-                <a:schemeClr val="accent1"/>
-              </a:fillRef>
-              <a:effectRef idx="0">
-                <a:schemeClr val="accent1"/>
-              </a:effectRef>
-              <a:fontRef idx="minor">
-                <a:schemeClr val="lt1"/>
-              </a:fontRef>
-            </p:style>
-            <p:txBody>
-              <a:bodyPr rtlCol="0" anchor="ctr"/>
-              <a:lstStyle/>
-              <a:p>
-                <a:pPr algn="ctr"/>
-                <a:endParaRPr lang="en-PH"/>
-              </a:p>
-            </p:txBody>
-          </p:sp>
-          <p:sp>
-            <p:nvSpPr>
-              <p:cNvPr id="37" name="Rectangle: Rounded Corners 36">
-                <a:extLst>
-                  <a:ext uri="{FF2B5EF4-FFF2-40B4-BE49-F238E27FC236}">
-                    <a16:creationId xmlns:a16="http://schemas.microsoft.com/office/drawing/2014/main" id="{5E06DD57-B8BF-9D88-2F6C-6D5181DF398F}"/>
-                  </a:ext>
-                </a:extLst>
-              </p:cNvPr>
-              <p:cNvSpPr/>
-              <p:nvPr/>
-            </p:nvSpPr>
-            <p:spPr>
-              <a:xfrm rot="10800000">
-                <a:off x="960697" y="3345654"/>
-                <a:ext cx="1934901" cy="516691"/>
-              </a:xfrm>
-              <a:prstGeom prst="roundRect">
-                <a:avLst>
-                  <a:gd name="adj" fmla="val 10003"/>
-                </a:avLst>
-              </a:prstGeom>
-              <a:solidFill>
-                <a:schemeClr val="bg1"/>
-              </a:solidFill>
-              <a:ln>
-                <a:noFill/>
-              </a:ln>
-            </p:spPr>
-            <p:style>
-              <a:lnRef idx="2">
-                <a:schemeClr val="accent1">
-                  <a:shade val="50000"/>
-                </a:schemeClr>
-              </a:lnRef>
-              <a:fillRef idx="1">
-                <a:schemeClr val="accent1"/>
-              </a:fillRef>
-              <a:effectRef idx="0">
-                <a:schemeClr val="accent1"/>
-              </a:effectRef>
-              <a:fontRef idx="minor">
-                <a:schemeClr val="lt1"/>
-              </a:fontRef>
-            </p:style>
-            <p:txBody>
-              <a:bodyPr rtlCol="0" anchor="ctr"/>
-              <a:lstStyle/>
-              <a:p>
-                <a:pPr algn="ctr"/>
-                <a:endParaRPr lang="en-PH"/>
-              </a:p>
-            </p:txBody>
-          </p:sp>
-          <p:sp>
-            <p:nvSpPr>
-              <p:cNvPr id="38" name="Rectangle: Rounded Corners 37">
-                <a:extLst>
-                  <a:ext uri="{FF2B5EF4-FFF2-40B4-BE49-F238E27FC236}">
-                    <a16:creationId xmlns:a16="http://schemas.microsoft.com/office/drawing/2014/main" id="{B9A3F5F9-6572-3535-E108-C35BD3EE4DF5}"/>
-                  </a:ext>
-                </a:extLst>
-              </p:cNvPr>
-              <p:cNvSpPr/>
-              <p:nvPr/>
-            </p:nvSpPr>
-            <p:spPr>
-              <a:xfrm rot="10800000">
-                <a:off x="1274412" y="3648851"/>
-                <a:ext cx="1350500" cy="516691"/>
-              </a:xfrm>
-              <a:prstGeom prst="roundRect">
-                <a:avLst>
-                  <a:gd name="adj" fmla="val 10003"/>
-                </a:avLst>
-              </a:prstGeom>
-              <a:solidFill>
-                <a:schemeClr val="bg1"/>
-              </a:solidFill>
-              <a:ln>
-                <a:noFill/>
-              </a:ln>
-            </p:spPr>
-            <p:style>
-              <a:lnRef idx="2">
-                <a:schemeClr val="accent1">
-                  <a:shade val="50000"/>
-                </a:schemeClr>
-              </a:lnRef>
-              <a:fillRef idx="1">
-                <a:schemeClr val="accent1"/>
-              </a:fillRef>
-              <a:effectRef idx="0">
-                <a:schemeClr val="accent1"/>
-              </a:effectRef>
-              <a:fontRef idx="minor">
-                <a:schemeClr val="lt1"/>
-              </a:fontRef>
-            </p:style>
-            <p:txBody>
-              <a:bodyPr rtlCol="0" anchor="ctr"/>
-              <a:lstStyle/>
-              <a:p>
-                <a:pPr algn="ctr"/>
-                <a:endParaRPr lang="en-PH"/>
-              </a:p>
-            </p:txBody>
-          </p:sp>
-          <p:sp>
-            <p:nvSpPr>
-              <p:cNvPr id="39" name="Rectangle: Rounded Corners 38">
-                <a:extLst>
-                  <a:ext uri="{FF2B5EF4-FFF2-40B4-BE49-F238E27FC236}">
-                    <a16:creationId xmlns:a16="http://schemas.microsoft.com/office/drawing/2014/main" id="{438FBCC2-121C-B4B1-F9D0-9388450CA7ED}"/>
-                  </a:ext>
-                </a:extLst>
-              </p:cNvPr>
-              <p:cNvSpPr/>
-              <p:nvPr/>
-            </p:nvSpPr>
-            <p:spPr>
-              <a:xfrm rot="12689537">
-                <a:off x="991528" y="3751878"/>
-                <a:ext cx="759353" cy="332139"/>
-              </a:xfrm>
-              <a:prstGeom prst="roundRect">
-                <a:avLst>
-                  <a:gd name="adj" fmla="val 10003"/>
-                </a:avLst>
-              </a:prstGeom>
-              <a:solidFill>
-                <a:schemeClr val="bg1"/>
-              </a:solidFill>
-              <a:ln>
-                <a:noFill/>
-              </a:ln>
-            </p:spPr>
-            <p:style>
-              <a:lnRef idx="2">
-                <a:schemeClr val="accent1">
-                  <a:shade val="50000"/>
-                </a:schemeClr>
-              </a:lnRef>
-              <a:fillRef idx="1">
-                <a:schemeClr val="accent1"/>
-              </a:fillRef>
-              <a:effectRef idx="0">
-                <a:schemeClr val="accent1"/>
-              </a:effectRef>
-              <a:fontRef idx="minor">
-                <a:schemeClr val="lt1"/>
-              </a:fontRef>
-            </p:style>
-            <p:txBody>
-              <a:bodyPr rtlCol="0" anchor="ctr"/>
-              <a:lstStyle/>
-              <a:p>
-                <a:pPr algn="ctr"/>
-                <a:endParaRPr lang="en-PH"/>
-              </a:p>
-            </p:txBody>
-          </p:sp>
-          <p:sp>
-            <p:nvSpPr>
-              <p:cNvPr id="40" name="Rectangle: Rounded Corners 39">
-                <a:extLst>
-                  <a:ext uri="{FF2B5EF4-FFF2-40B4-BE49-F238E27FC236}">
-                    <a16:creationId xmlns:a16="http://schemas.microsoft.com/office/drawing/2014/main" id="{E95715C2-554B-4EC8-9F04-BB8D8A5815A3}"/>
-                  </a:ext>
-                </a:extLst>
-              </p:cNvPr>
-              <p:cNvSpPr/>
-              <p:nvPr/>
-            </p:nvSpPr>
-            <p:spPr>
-              <a:xfrm rot="8332915">
-                <a:off x="2444354" y="3686246"/>
-                <a:ext cx="374707" cy="332139"/>
-              </a:xfrm>
-              <a:prstGeom prst="roundRect">
-                <a:avLst>
-                  <a:gd name="adj" fmla="val 10003"/>
-                </a:avLst>
-              </a:prstGeom>
-              <a:solidFill>
-                <a:schemeClr val="bg1"/>
-              </a:solidFill>
-              <a:ln>
-                <a:noFill/>
-              </a:ln>
-            </p:spPr>
-            <p:style>
-              <a:lnRef idx="2">
-                <a:schemeClr val="accent1">
-                  <a:shade val="50000"/>
-                </a:schemeClr>
-              </a:lnRef>
-              <a:fillRef idx="1">
-                <a:schemeClr val="accent1"/>
-              </a:fillRef>
-              <a:effectRef idx="0">
-                <a:schemeClr val="accent1"/>
-              </a:effectRef>
-              <a:fontRef idx="minor">
-                <a:schemeClr val="lt1"/>
-              </a:fontRef>
-            </p:style>
-            <p:txBody>
-              <a:bodyPr rtlCol="0" anchor="ctr"/>
-              <a:lstStyle/>
-              <a:p>
-                <a:pPr algn="ctr"/>
-                <a:endParaRPr lang="en-PH" dirty="0"/>
-              </a:p>
-            </p:txBody>
-          </p:sp>
-          <p:sp>
-            <p:nvSpPr>
-              <p:cNvPr id="41" name="Rectangle: Rounded Corners 40">
-                <a:extLst>
-                  <a:ext uri="{FF2B5EF4-FFF2-40B4-BE49-F238E27FC236}">
-                    <a16:creationId xmlns:a16="http://schemas.microsoft.com/office/drawing/2014/main" id="{7D63E209-D279-9397-80EA-218EAF78EF47}"/>
-                  </a:ext>
-                </a:extLst>
-              </p:cNvPr>
-              <p:cNvSpPr/>
-              <p:nvPr/>
-            </p:nvSpPr>
-            <p:spPr>
-              <a:xfrm rot="10800000">
-                <a:off x="1841043" y="3301250"/>
-                <a:ext cx="350216" cy="88808"/>
-              </a:xfrm>
-              <a:prstGeom prst="roundRect">
-                <a:avLst>
-                  <a:gd name="adj" fmla="val 10003"/>
-                </a:avLst>
-              </a:prstGeom>
-              <a:solidFill>
-                <a:schemeClr val="bg1"/>
-              </a:solidFill>
-              <a:ln>
-                <a:noFill/>
-              </a:ln>
-            </p:spPr>
-            <p:style>
-              <a:lnRef idx="2">
-                <a:schemeClr val="accent1">
-                  <a:shade val="50000"/>
-                </a:schemeClr>
-              </a:lnRef>
-              <a:fillRef idx="1">
-                <a:schemeClr val="accent1"/>
-              </a:fillRef>
-              <a:effectRef idx="0">
-                <a:schemeClr val="accent1"/>
-              </a:effectRef>
-              <a:fontRef idx="minor">
-                <a:schemeClr val="lt1"/>
-              </a:fontRef>
-            </p:style>
-            <p:txBody>
-              <a:bodyPr rtlCol="0" anchor="ctr"/>
-              <a:lstStyle/>
-              <a:p>
-                <a:pPr algn="ctr"/>
-                <a:endParaRPr lang="en-PH" dirty="0"/>
-              </a:p>
-            </p:txBody>
-          </p:sp>
+          </p:pic>
         </p:grpSp>
-        <p:pic>
-          <p:nvPicPr>
-            <p:cNvPr id="15" name="Picture 14">
+        <p:sp>
+          <p:nvSpPr>
+            <p:cNvPr id="2" name="TextBox 1">
               <a:extLst>
                 <a:ext uri="{FF2B5EF4-FFF2-40B4-BE49-F238E27FC236}">
-                  <a16:creationId xmlns:a16="http://schemas.microsoft.com/office/drawing/2014/main" id="{EEF907CC-CBC6-34A5-4A31-E64E8068E4C0}"/>
+                  <a16:creationId xmlns:a16="http://schemas.microsoft.com/office/drawing/2014/main" id="{93D061B5-423C-CA0F-6533-F201BBFD0DCB}"/>
                 </a:ext>
               </a:extLst>
             </p:cNvPr>
-            <p:cNvPicPr>
-              <a:picLocks noChangeAspect="1"/>
-            </p:cNvPicPr>
+            <p:cNvSpPr txBox="1"/>
             <p:nvPr/>
-          </p:nvPicPr>
-          <p:blipFill>
-            <a:blip r:embed="rId2">
-              <a:duotone>
-                <a:prstClr val="black"/>
-                <a:srgbClr val="43FF47">
-                  <a:tint val="45000"/>
-                  <a:satMod val="400000"/>
-                </a:srgbClr>
-              </a:duotone>
-              <a:extLst>
-                <a:ext uri="{BEBA8EAE-BF5A-486C-A8C5-ECC9F3942E4B}">
-                  <a14:imgProps xmlns:a14="http://schemas.microsoft.com/office/drawing/2010/main">
-                    <a14:imgLayer r:embed="rId3">
-                      <a14:imgEffect>
-                        <a14:sharpenSoften amount="50000"/>
-                      </a14:imgEffect>
-                      <a14:imgEffect>
-                        <a14:colorTemperature colorTemp="7200"/>
-                      </a14:imgEffect>
-                      <a14:imgEffect>
-                        <a14:saturation sat="200000"/>
-                      </a14:imgEffect>
-                      <a14:imgEffect>
-                        <a14:brightnessContrast bright="20000" contrast="-40000"/>
-                      </a14:imgEffect>
-                    </a14:imgLayer>
-                  </a14:imgProps>
-                </a:ext>
-              </a:extLst>
-            </a:blip>
-            <a:stretch>
-              <a:fillRect/>
-            </a:stretch>
-          </p:blipFill>
+          </p:nvSpPr>
           <p:spPr>
             <a:xfrm>
-              <a:off x="878940" y="2088548"/>
-              <a:ext cx="2890503" cy="2890503"/>
+              <a:off x="4311658" y="2598003"/>
+              <a:ext cx="6837994" cy="1661993"/>
             </a:xfrm>
             <a:prstGeom prst="rect">
               <a:avLst/>
             </a:prstGeom>
+            <a:noFill/>
           </p:spPr>
-        </p:pic>
+          <p:txBody>
+            <a:bodyPr wrap="square" rtlCol="0">
+              <a:spAutoFit/>
+            </a:bodyPr>
+            <a:lstStyle/>
+            <a:p>
+              <a:r>
+                <a:rPr lang="en-PH" sz="10200" b="1" dirty="0">
+                  <a:solidFill>
+                    <a:srgbClr val="50AD51"/>
+                  </a:solidFill>
+                  <a:latin typeface="Eras Demi ITC" panose="020B0805030504020804" pitchFamily="34" charset="0"/>
+                  <a:cs typeface="Segoe UI" panose="020B0502040204020203" pitchFamily="34" charset="0"/>
+                </a:rPr>
+                <a:t>BIZBUDDY</a:t>
+              </a:r>
+            </a:p>
+          </p:txBody>
+        </p:sp>
+        <p:sp>
+          <p:nvSpPr>
+            <p:cNvPr id="4" name="TextBox 3">
+              <a:extLst>
+                <a:ext uri="{FF2B5EF4-FFF2-40B4-BE49-F238E27FC236}">
+                  <a16:creationId xmlns:a16="http://schemas.microsoft.com/office/drawing/2014/main" id="{C34916F8-59BF-5935-33EE-EBDBFC80E783}"/>
+                </a:ext>
+              </a:extLst>
+            </p:cNvPr>
+            <p:cNvSpPr txBox="1"/>
+            <p:nvPr/>
+          </p:nvSpPr>
+          <p:spPr>
+            <a:xfrm>
+              <a:off x="4311658" y="4169234"/>
+              <a:ext cx="6837993" cy="584775"/>
+            </a:xfrm>
+            <a:prstGeom prst="rect">
+              <a:avLst/>
+            </a:prstGeom>
+            <a:noFill/>
+          </p:spPr>
+          <p:txBody>
+            <a:bodyPr wrap="square" rtlCol="0">
+              <a:spAutoFit/>
+            </a:bodyPr>
+            <a:lstStyle/>
+            <a:p>
+              <a:r>
+                <a:rPr lang="en-PH" sz="3200" b="1" dirty="0">
+                  <a:solidFill>
+                    <a:srgbClr val="EF911E"/>
+                  </a:solidFill>
+                  <a:latin typeface="Corbel" panose="020B0503020204020204" pitchFamily="34" charset="0"/>
+                  <a:cs typeface="Segoe UI" panose="020B0502040204020203" pitchFamily="34" charset="0"/>
+                </a:rPr>
+                <a:t>BUSINESS MADE EASY AND SMART.</a:t>
+              </a:r>
+            </a:p>
+          </p:txBody>
+        </p:sp>
+        <p:cxnSp>
+          <p:nvCxnSpPr>
+            <p:cNvPr id="7" name="Straight Connector 6">
+              <a:extLst>
+                <a:ext uri="{FF2B5EF4-FFF2-40B4-BE49-F238E27FC236}">
+                  <a16:creationId xmlns:a16="http://schemas.microsoft.com/office/drawing/2014/main" id="{46BAECAB-D70D-DE36-95B1-FD7E1AFC5B76}"/>
+                </a:ext>
+              </a:extLst>
+            </p:cNvPr>
+            <p:cNvCxnSpPr>
+              <a:cxnSpLocks/>
+            </p:cNvCxnSpPr>
+            <p:nvPr/>
+          </p:nvCxnSpPr>
+          <p:spPr>
+            <a:xfrm>
+              <a:off x="4124351" y="2371920"/>
+              <a:ext cx="0" cy="2660072"/>
+            </a:xfrm>
+            <a:prstGeom prst="line">
+              <a:avLst/>
+            </a:prstGeom>
+            <a:ln w="76200">
+              <a:solidFill>
+                <a:srgbClr val="50AD51"/>
+              </a:solidFill>
+            </a:ln>
+          </p:spPr>
+          <p:style>
+            <a:lnRef idx="1">
+              <a:schemeClr val="accent1"/>
+            </a:lnRef>
+            <a:fillRef idx="0">
+              <a:schemeClr val="accent1"/>
+            </a:fillRef>
+            <a:effectRef idx="0">
+              <a:schemeClr val="accent1"/>
+            </a:effectRef>
+            <a:fontRef idx="minor">
+              <a:schemeClr val="tx1"/>
+            </a:fontRef>
+          </p:style>
+        </p:cxnSp>
       </p:grpSp>
-      <p:sp>
-        <p:nvSpPr>
-          <p:cNvPr id="2" name="TextBox 1">
-            <a:extLst>
-              <a:ext uri="{FF2B5EF4-FFF2-40B4-BE49-F238E27FC236}">
-                <a16:creationId xmlns:a16="http://schemas.microsoft.com/office/drawing/2014/main" id="{93D061B5-423C-CA0F-6533-F201BBFD0DCB}"/>
-              </a:ext>
-            </a:extLst>
-          </p:cNvPr>
-          <p:cNvSpPr txBox="1"/>
+      <p:pic>
+        <p:nvPicPr>
+          <p:cNvPr id="5" name="Picture 4">
+            <a:extLst>
+              <a:ext uri="{FF2B5EF4-FFF2-40B4-BE49-F238E27FC236}">
+                <a16:creationId xmlns:a16="http://schemas.microsoft.com/office/drawing/2014/main" id="{85B62CAB-D3B0-42A4-4F4B-6256C7AAF6E3}"/>
+              </a:ext>
+            </a:extLst>
+          </p:cNvPr>
+          <p:cNvPicPr>
+            <a:picLocks noChangeAspect="1"/>
+          </p:cNvPicPr>
           <p:nvPr/>
-        </p:nvSpPr>
+        </p:nvPicPr>
+        <p:blipFill>
+          <a:blip r:embed="rId4"/>
+          <a:stretch>
+            <a:fillRect/>
+          </a:stretch>
+        </p:blipFill>
         <p:spPr>
           <a:xfrm>
-            <a:off x="4311658" y="2598003"/>
-            <a:ext cx="6837994" cy="1661993"/>
+            <a:off x="11572969" y="1218531"/>
+            <a:ext cx="771633" cy="781159"/>
           </a:xfrm>
           <a:prstGeom prst="rect">
             <a:avLst/>
           </a:prstGeom>
-          <a:noFill/>
         </p:spPr>
-        <p:txBody>
-          <a:bodyPr wrap="square" rtlCol="0">
-            <a:spAutoFit/>
-          </a:bodyPr>
-          <a:lstStyle/>
-          <a:p>
-            <a:r>
-              <a:rPr lang="en-PH" sz="10200" b="1" dirty="0">
-                <a:solidFill>
-                  <a:srgbClr val="50AD51"/>
-                </a:solidFill>
-                <a:latin typeface="Eras Demi ITC" panose="020B0805030504020804" pitchFamily="34" charset="0"/>
-                <a:cs typeface="Segoe UI" panose="020B0502040204020203" pitchFamily="34" charset="0"/>
-              </a:rPr>
-              <a:t>BIZBUDDY</a:t>
-            </a:r>
-          </a:p>
-        </p:txBody>
-      </p:sp>
-      <p:sp>
-        <p:nvSpPr>
-          <p:cNvPr id="4" name="TextBox 3">
-            <a:extLst>
-              <a:ext uri="{FF2B5EF4-FFF2-40B4-BE49-F238E27FC236}">
-                <a16:creationId xmlns:a16="http://schemas.microsoft.com/office/drawing/2014/main" id="{C34916F8-59BF-5935-33EE-EBDBFC80E783}"/>
-              </a:ext>
-            </a:extLst>
-          </p:cNvPr>
-          <p:cNvSpPr txBox="1"/>
-          <p:nvPr/>
-        </p:nvSpPr>
-        <p:spPr>
-          <a:xfrm>
-            <a:off x="4311658" y="4169234"/>
-            <a:ext cx="6837993" cy="584775"/>
-          </a:xfrm>
-          <a:prstGeom prst="rect">
-            <a:avLst/>
-          </a:prstGeom>
-          <a:noFill/>
-        </p:spPr>
-        <p:txBody>
-          <a:bodyPr wrap="square" rtlCol="0">
-            <a:spAutoFit/>
-          </a:bodyPr>
-          <a:lstStyle/>
-          <a:p>
-            <a:r>
-              <a:rPr lang="en-PH" sz="3200" b="1" dirty="0">
-                <a:solidFill>
-                  <a:srgbClr val="EF911E"/>
-                </a:solidFill>
-                <a:latin typeface="Corbel" panose="020B0503020204020204" pitchFamily="34" charset="0"/>
-                <a:cs typeface="Segoe UI" panose="020B0502040204020203" pitchFamily="34" charset="0"/>
-              </a:rPr>
-              <a:t>BUSINESS MADE EASY AND SMART.</a:t>
-            </a:r>
-          </a:p>
-        </p:txBody>
-      </p:sp>
-      <p:cxnSp>
-        <p:nvCxnSpPr>
-          <p:cNvPr id="7" name="Straight Connector 6">
-            <a:extLst>
-              <a:ext uri="{FF2B5EF4-FFF2-40B4-BE49-F238E27FC236}">
-                <a16:creationId xmlns:a16="http://schemas.microsoft.com/office/drawing/2014/main" id="{46BAECAB-D70D-DE36-95B1-FD7E1AFC5B76}"/>
-              </a:ext>
-            </a:extLst>
-          </p:cNvPr>
-          <p:cNvCxnSpPr>
-            <a:cxnSpLocks/>
-          </p:cNvCxnSpPr>
-          <p:nvPr/>
-        </p:nvCxnSpPr>
-        <p:spPr>
-          <a:xfrm>
-            <a:off x="4124351" y="2371920"/>
-            <a:ext cx="0" cy="2660072"/>
-          </a:xfrm>
-          <a:prstGeom prst="line">
-            <a:avLst/>
-          </a:prstGeom>
-          <a:ln w="76200">
-            <a:solidFill>
-              <a:srgbClr val="50AD51"/>
-            </a:solidFill>
-          </a:ln>
-        </p:spPr>
-        <p:style>
-          <a:lnRef idx="1">
-            <a:schemeClr val="accent1"/>
-          </a:lnRef>
-          <a:fillRef idx="0">
-            <a:schemeClr val="accent1"/>
-          </a:fillRef>
-          <a:effectRef idx="0">
-            <a:schemeClr val="accent1"/>
-          </a:effectRef>
-          <a:fontRef idx="minor">
-            <a:schemeClr val="tx1"/>
-          </a:fontRef>
-        </p:style>
-      </p:cxnSp>
+      </p:pic>
     </p:spTree>
     <p:extLst>
       <p:ext uri="{BB962C8B-B14F-4D97-AF65-F5344CB8AC3E}">

</xml_diff>